<commit_message>
khoe fix bao cao
</commit_message>
<xml_diff>
--- a/Class Diagram/post_class.pptx
+++ b/Class Diagram/post_class.pptx
@@ -105,6 +105,11 @@
       </a:defRPr>
     </a:lvl9pPr>
   </p:defaultTextStyle>
+  <p:extLst>
+    <p:ext uri="{EFAFB233-063F-42B5-8137-9DF3F51BA10A}">
+      <p15:sldGuideLst xmlns:p15="http://schemas.microsoft.com/office/powerpoint/2012/main"/>
+    </p:ext>
+  </p:extLst>
 </p:presentation>
 </file>
 
@@ -255,7 +260,7 @@
           <a:p>
             <a:fld id="{9916A0F1-F9C7-4337-BB2B-E56E5F0ED70E}" type="datetimeFigureOut">
               <a:rPr lang="en-US" smtClean="0"/>
-              <a:t>5/18/2025</a:t>
+              <a:t>5/20/2025</a:t>
             </a:fld>
             <a:endParaRPr lang="en-US"/>
           </a:p>
@@ -453,7 +458,7 @@
           <a:p>
             <a:fld id="{9916A0F1-F9C7-4337-BB2B-E56E5F0ED70E}" type="datetimeFigureOut">
               <a:rPr lang="en-US" smtClean="0"/>
-              <a:t>5/18/2025</a:t>
+              <a:t>5/20/2025</a:t>
             </a:fld>
             <a:endParaRPr lang="en-US"/>
           </a:p>
@@ -661,7 +666,7 @@
           <a:p>
             <a:fld id="{9916A0F1-F9C7-4337-BB2B-E56E5F0ED70E}" type="datetimeFigureOut">
               <a:rPr lang="en-US" smtClean="0"/>
-              <a:t>5/18/2025</a:t>
+              <a:t>5/20/2025</a:t>
             </a:fld>
             <a:endParaRPr lang="en-US"/>
           </a:p>
@@ -859,7 +864,7 @@
           <a:p>
             <a:fld id="{9916A0F1-F9C7-4337-BB2B-E56E5F0ED70E}" type="datetimeFigureOut">
               <a:rPr lang="en-US" smtClean="0"/>
-              <a:t>5/18/2025</a:t>
+              <a:t>5/20/2025</a:t>
             </a:fld>
             <a:endParaRPr lang="en-US"/>
           </a:p>
@@ -1134,7 +1139,7 @@
           <a:p>
             <a:fld id="{9916A0F1-F9C7-4337-BB2B-E56E5F0ED70E}" type="datetimeFigureOut">
               <a:rPr lang="en-US" smtClean="0"/>
-              <a:t>5/18/2025</a:t>
+              <a:t>5/20/2025</a:t>
             </a:fld>
             <a:endParaRPr lang="en-US"/>
           </a:p>
@@ -1399,7 +1404,7 @@
           <a:p>
             <a:fld id="{9916A0F1-F9C7-4337-BB2B-E56E5F0ED70E}" type="datetimeFigureOut">
               <a:rPr lang="en-US" smtClean="0"/>
-              <a:t>5/18/2025</a:t>
+              <a:t>5/20/2025</a:t>
             </a:fld>
             <a:endParaRPr lang="en-US"/>
           </a:p>
@@ -1811,7 +1816,7 @@
           <a:p>
             <a:fld id="{9916A0F1-F9C7-4337-BB2B-E56E5F0ED70E}" type="datetimeFigureOut">
               <a:rPr lang="en-US" smtClean="0"/>
-              <a:t>5/18/2025</a:t>
+              <a:t>5/20/2025</a:t>
             </a:fld>
             <a:endParaRPr lang="en-US"/>
           </a:p>
@@ -1952,7 +1957,7 @@
           <a:p>
             <a:fld id="{9916A0F1-F9C7-4337-BB2B-E56E5F0ED70E}" type="datetimeFigureOut">
               <a:rPr lang="en-US" smtClean="0"/>
-              <a:t>5/18/2025</a:t>
+              <a:t>5/20/2025</a:t>
             </a:fld>
             <a:endParaRPr lang="en-US"/>
           </a:p>
@@ -2065,7 +2070,7 @@
           <a:p>
             <a:fld id="{9916A0F1-F9C7-4337-BB2B-E56E5F0ED70E}" type="datetimeFigureOut">
               <a:rPr lang="en-US" smtClean="0"/>
-              <a:t>5/18/2025</a:t>
+              <a:t>5/20/2025</a:t>
             </a:fld>
             <a:endParaRPr lang="en-US"/>
           </a:p>
@@ -2376,7 +2381,7 @@
           <a:p>
             <a:fld id="{9916A0F1-F9C7-4337-BB2B-E56E5F0ED70E}" type="datetimeFigureOut">
               <a:rPr lang="en-US" smtClean="0"/>
-              <a:t>5/18/2025</a:t>
+              <a:t>5/20/2025</a:t>
             </a:fld>
             <a:endParaRPr lang="en-US"/>
           </a:p>
@@ -2664,7 +2669,7 @@
           <a:p>
             <a:fld id="{9916A0F1-F9C7-4337-BB2B-E56E5F0ED70E}" type="datetimeFigureOut">
               <a:rPr lang="en-US" smtClean="0"/>
-              <a:t>5/18/2025</a:t>
+              <a:t>5/20/2025</a:t>
             </a:fld>
             <a:endParaRPr lang="en-US"/>
           </a:p>
@@ -2905,7 +2910,7 @@
           <a:p>
             <a:fld id="{9916A0F1-F9C7-4337-BB2B-E56E5F0ED70E}" type="datetimeFigureOut">
               <a:rPr lang="en-US" smtClean="0"/>
-              <a:t>5/18/2025</a:t>
+              <a:t>5/20/2025</a:t>
             </a:fld>
             <a:endParaRPr lang="en-US"/>
           </a:p>
@@ -3436,7 +3441,7 @@
         </p:nvGrpSpPr>
         <p:grpSpPr>
           <a:xfrm>
-            <a:off x="7016897" y="775954"/>
+            <a:off x="7239256" y="377028"/>
             <a:ext cx="2016641" cy="457200"/>
             <a:chOff x="9861699" y="3997624"/>
             <a:chExt cx="2016641" cy="457200"/>
@@ -3618,10 +3623,7 @@
                 <a:rPr lang="en-US" sz="1800" dirty="0"/>
                 <a:t>category</a:t>
               </a:r>
-              <a:r>
-                <a:rPr lang="en-US" dirty="0"/>
-                <a:t> Node</a:t>
-              </a:r>
+              <a:endParaRPr lang="en-US" dirty="0"/>
             </a:p>
           </p:txBody>
         </p:sp>
@@ -3720,7 +3722,7 @@
             <a:p>
               <a:r>
                 <a:rPr lang="en-US" dirty="0"/>
-                <a:t>User Node</a:t>
+                <a:t>User</a:t>
               </a:r>
             </a:p>
           </p:txBody>
@@ -3820,7 +3822,7 @@
             <a:p>
               <a:r>
                 <a:rPr lang="en-US" dirty="0"/>
-                <a:t>Post Node</a:t>
+                <a:t>Post</a:t>
               </a:r>
             </a:p>
           </p:txBody>
@@ -3837,15 +3839,14 @@
           </p:cNvPr>
           <p:cNvCxnSpPr>
             <a:cxnSpLocks/>
-            <a:stCxn id="73" idx="3"/>
             <a:endCxn id="6" idx="0"/>
           </p:cNvCxnSpPr>
           <p:nvPr/>
         </p:nvCxnSpPr>
         <p:spPr>
           <a:xfrm flipH="1">
-            <a:off x="9033539" y="899739"/>
-            <a:ext cx="2006496" cy="2529261"/>
+            <a:off x="9033539" y="897600"/>
+            <a:ext cx="2426924" cy="2531400"/>
           </a:xfrm>
           <a:prstGeom prst="line">
             <a:avLst/>
@@ -3887,8 +3888,8 @@
         </p:nvCxnSpPr>
         <p:spPr>
           <a:xfrm>
-            <a:off x="7913576" y="1233154"/>
-            <a:ext cx="1119963" cy="2195846"/>
+            <a:off x="8135935" y="834228"/>
+            <a:ext cx="897604" cy="2594772"/>
           </a:xfrm>
           <a:prstGeom prst="line">
             <a:avLst/>
@@ -4011,7 +4012,7 @@
         </p:nvGrpSpPr>
         <p:grpSpPr>
           <a:xfrm>
-            <a:off x="6286696" y="5142612"/>
+            <a:off x="6332402" y="5343096"/>
             <a:ext cx="1448729" cy="457200"/>
             <a:chOff x="9861699" y="3997624"/>
             <a:chExt cx="2016641" cy="457200"/>
@@ -4211,10 +4212,10 @@
         </p:nvGrpSpPr>
         <p:grpSpPr>
           <a:xfrm rot="20601777">
-            <a:off x="5579878" y="3423870"/>
-            <a:ext cx="1322849" cy="1722855"/>
-            <a:chOff x="10898233" y="4848138"/>
-            <a:chExt cx="1322877" cy="1722859"/>
+            <a:off x="5596212" y="3423473"/>
+            <a:ext cx="1322849" cy="1928032"/>
+            <a:chOff x="10884625" y="4848138"/>
+            <a:chExt cx="1322877" cy="1928036"/>
           </a:xfrm>
         </p:grpSpPr>
         <p:cxnSp>
@@ -4234,7 +4235,7 @@
           </p:nvCxnSpPr>
           <p:spPr>
             <a:xfrm rot="998223" flipH="1" flipV="1">
-              <a:off x="10898233" y="5044649"/>
+              <a:off x="10884625" y="5249826"/>
               <a:ext cx="1322877" cy="1526348"/>
             </a:xfrm>
             <a:prstGeom prst="line">
@@ -4625,7 +4626,7 @@
         </p:nvGrpSpPr>
         <p:grpSpPr>
           <a:xfrm>
-            <a:off x="4080301" y="1741751"/>
+            <a:off x="2936191" y="356518"/>
             <a:ext cx="1717648" cy="457200"/>
             <a:chOff x="9861699" y="3997624"/>
             <a:chExt cx="2390978" cy="457200"/>
@@ -4790,8 +4791,8 @@
         </p:nvGrpSpPr>
         <p:grpSpPr>
           <a:xfrm>
-            <a:off x="945549" y="492198"/>
-            <a:ext cx="1717648" cy="457200"/>
+            <a:off x="359765" y="339529"/>
+            <a:ext cx="1803890" cy="457200"/>
             <a:chOff x="9861699" y="3997624"/>
             <a:chExt cx="2390978" cy="457200"/>
           </a:xfrm>
@@ -5027,14 +5028,15 @@
           </p:cNvPr>
           <p:cNvCxnSpPr>
             <a:cxnSpLocks/>
+            <a:stCxn id="47" idx="2"/>
             <a:endCxn id="113" idx="0"/>
           </p:cNvCxnSpPr>
           <p:nvPr/>
         </p:nvCxnSpPr>
         <p:spPr>
-          <a:xfrm flipH="1">
-            <a:off x="986771" y="973454"/>
-            <a:ext cx="424763" cy="1226348"/>
+          <a:xfrm>
+            <a:off x="1120500" y="796729"/>
+            <a:ext cx="4446" cy="1305748"/>
           </a:xfrm>
           <a:prstGeom prst="line">
             <a:avLst/>
@@ -5073,8 +5075,8 @@
         </p:nvCxnSpPr>
         <p:spPr>
           <a:xfrm>
-            <a:off x="4804666" y="2198951"/>
-            <a:ext cx="694369" cy="882970"/>
+            <a:off x="3660556" y="813718"/>
+            <a:ext cx="1838479" cy="2268203"/>
           </a:xfrm>
           <a:prstGeom prst="line">
             <a:avLst/>
@@ -5230,9 +5232,9 @@
           <p:nvPr/>
         </p:nvCxnSpPr>
         <p:spPr>
-          <a:xfrm flipV="1">
-            <a:off x="5278376" y="5327278"/>
-            <a:ext cx="1008320" cy="184666"/>
+          <a:xfrm>
+            <a:off x="5252696" y="5527762"/>
+            <a:ext cx="1079706" cy="0"/>
           </a:xfrm>
           <a:prstGeom prst="line">
             <a:avLst/>
@@ -5344,15 +5346,14 @@
           </p:cNvPr>
           <p:cNvCxnSpPr>
             <a:cxnSpLocks/>
-            <a:stCxn id="47" idx="2"/>
             <a:endCxn id="43" idx="1"/>
           </p:cNvCxnSpPr>
           <p:nvPr/>
         </p:nvCxnSpPr>
         <p:spPr>
           <a:xfrm>
-            <a:off x="1669914" y="949398"/>
-            <a:ext cx="2410387" cy="977019"/>
+            <a:off x="1899761" y="541184"/>
+            <a:ext cx="1036430" cy="0"/>
           </a:xfrm>
           <a:prstGeom prst="line">
             <a:avLst/>
@@ -5619,7 +5620,7 @@
         </p:nvSpPr>
         <p:spPr>
           <a:xfrm>
-            <a:off x="5495275" y="3843200"/>
+            <a:off x="5506690" y="3965002"/>
             <a:ext cx="1448729" cy="369332"/>
           </a:xfrm>
           <a:prstGeom prst="rect">
@@ -5656,9 +5657,9 @@
           <p:nvPr/>
         </p:nvCxnSpPr>
         <p:spPr>
-          <a:xfrm flipV="1">
-            <a:off x="8769176" y="629052"/>
-            <a:ext cx="1559783" cy="369332"/>
+          <a:xfrm>
+            <a:off x="9033539" y="619959"/>
+            <a:ext cx="1295420" cy="9093"/>
           </a:xfrm>
           <a:prstGeom prst="line">
             <a:avLst/>
@@ -5695,8 +5696,8 @@
           <p:nvPr/>
         </p:nvSpPr>
         <p:spPr>
-          <a:xfrm rot="20775127">
-            <a:off x="9089169" y="373777"/>
+          <a:xfrm>
+            <a:off x="9375701" y="690607"/>
             <a:ext cx="1448729" cy="246221"/>
           </a:xfrm>
           <a:prstGeom prst="rect">
@@ -5731,8 +5732,8 @@
           <p:nvPr/>
         </p:nvSpPr>
         <p:spPr>
-          <a:xfrm rot="14520498">
-            <a:off x="8961388" y="701325"/>
+          <a:xfrm rot="16200000">
+            <a:off x="9219354" y="725227"/>
             <a:ext cx="105257" cy="133535"/>
           </a:xfrm>
           <a:prstGeom prst="triangle">
@@ -5778,7 +5779,7 @@
         </p:nvSpPr>
         <p:spPr>
           <a:xfrm>
-            <a:off x="8857379" y="924707"/>
+            <a:off x="7872111" y="868054"/>
             <a:ext cx="1448729" cy="369332"/>
           </a:xfrm>
           <a:prstGeom prst="rect">
@@ -5813,7 +5814,7 @@
         </p:nvSpPr>
         <p:spPr>
           <a:xfrm>
-            <a:off x="9591306" y="715073"/>
+            <a:off x="9577591" y="1109373"/>
             <a:ext cx="1448729" cy="369332"/>
           </a:xfrm>
           <a:prstGeom prst="rect">
@@ -5921,8 +5922,8 @@
           <p:nvPr/>
         </p:nvSpPr>
         <p:spPr>
-          <a:xfrm rot="5400000">
-            <a:off x="10951276" y="2145173"/>
+          <a:xfrm>
+            <a:off x="11433801" y="2213988"/>
             <a:ext cx="1448729" cy="246221"/>
           </a:xfrm>
           <a:prstGeom prst="rect">
@@ -5938,7 +5939,7 @@
           <a:p>
             <a:r>
               <a:rPr lang="en-US" sz="1000" dirty="0" err="1"/>
-              <a:t>taggedwith</a:t>
+              <a:t>Thuộc</a:t>
             </a:r>
             <a:endParaRPr lang="en-US" sz="1000" dirty="0"/>
           </a:p>
@@ -5957,8 +5958,8 @@
           <p:nvPr/>
         </p:nvSpPr>
         <p:spPr>
-          <a:xfrm rot="10530217">
-            <a:off x="11953723" y="2315677"/>
+          <a:xfrm rot="10800000">
+            <a:off x="11570383" y="2641474"/>
             <a:ext cx="105257" cy="133535"/>
           </a:xfrm>
           <a:prstGeom prst="triangle">
@@ -6055,7 +6056,7 @@
           <a:p>
             <a:r>
               <a:rPr lang="en-US" dirty="0"/>
-              <a:t>*</a:t>
+              <a:t>1..*</a:t>
             </a:r>
           </a:p>
         </p:txBody>
@@ -6176,7 +6177,7 @@
         </p:nvSpPr>
         <p:spPr>
           <a:xfrm>
-            <a:off x="6426573" y="4793406"/>
+            <a:off x="6869389" y="5011153"/>
             <a:ext cx="1448729" cy="369332"/>
           </a:xfrm>
           <a:prstGeom prst="rect">
@@ -6211,7 +6212,7 @@
         </p:nvSpPr>
         <p:spPr>
           <a:xfrm>
-            <a:off x="5227819" y="5107218"/>
+            <a:off x="5228183" y="5175134"/>
             <a:ext cx="1448729" cy="369332"/>
           </a:xfrm>
           <a:prstGeom prst="rect">
@@ -6246,7 +6247,7 @@
         </p:nvSpPr>
         <p:spPr>
           <a:xfrm>
-            <a:off x="5988255" y="5084978"/>
+            <a:off x="5927706" y="5236875"/>
             <a:ext cx="1448729" cy="369332"/>
           </a:xfrm>
           <a:prstGeom prst="rect">
@@ -6281,9 +6282,9 @@
         </p:nvGrpSpPr>
         <p:grpSpPr>
           <a:xfrm>
-            <a:off x="5643356" y="1307880"/>
+            <a:off x="5710178" y="1315899"/>
             <a:ext cx="246221" cy="1448729"/>
-            <a:chOff x="5714122" y="1275508"/>
+            <a:chOff x="5780944" y="1283527"/>
             <a:chExt cx="246221" cy="1448729"/>
           </a:xfrm>
         </p:grpSpPr>
@@ -6301,7 +6302,7 @@
           </p:nvSpPr>
           <p:spPr>
             <a:xfrm rot="5992158">
-              <a:off x="5112868" y="1876762"/>
+              <a:off x="5179690" y="1884781"/>
               <a:ext cx="1448729" cy="246221"/>
             </a:xfrm>
             <a:prstGeom prst="rect">
@@ -6453,7 +6454,7 @@
         </p:nvSpPr>
         <p:spPr>
           <a:xfrm rot="3194156">
-            <a:off x="4381079" y="2698424"/>
+            <a:off x="3952392" y="2203117"/>
             <a:ext cx="1448729" cy="246221"/>
           </a:xfrm>
           <a:prstGeom prst="rect">
@@ -6488,7 +6489,7 @@
         </p:nvSpPr>
         <p:spPr>
           <a:xfrm rot="7900110">
-            <a:off x="5200068" y="2853696"/>
+            <a:off x="4796706" y="2468506"/>
             <a:ext cx="105257" cy="133535"/>
           </a:xfrm>
           <a:prstGeom prst="triangle">
@@ -6945,10 +6946,10 @@
         </p:nvGrpSpPr>
         <p:grpSpPr>
           <a:xfrm rot="4090734">
-            <a:off x="1217876" y="758893"/>
-            <a:ext cx="341186" cy="1448729"/>
-            <a:chOff x="5124271" y="5022228"/>
-            <a:chExt cx="341186" cy="1448729"/>
+            <a:off x="1044633" y="808268"/>
+            <a:ext cx="372754" cy="1448729"/>
+            <a:chOff x="5041485" y="5159203"/>
+            <a:chExt cx="372754" cy="1448729"/>
           </a:xfrm>
         </p:grpSpPr>
         <p:sp>
@@ -6965,7 +6966,7 @@
           </p:nvSpPr>
           <p:spPr>
             <a:xfrm rot="17509266">
-              <a:off x="4523017" y="5623482"/>
+              <a:off x="4440231" y="5760457"/>
               <a:ext cx="1448729" cy="246221"/>
             </a:xfrm>
             <a:prstGeom prst="rect">
@@ -7000,8 +7001,8 @@
             <p:nvPr/>
           </p:nvSpPr>
           <p:spPr>
-            <a:xfrm rot="6944005">
-              <a:off x="5346061" y="6137037"/>
+            <a:xfrm rot="6507049">
+              <a:off x="5294843" y="6171697"/>
               <a:ext cx="105257" cy="133535"/>
             </a:xfrm>
             <a:prstGeom prst="triangle">
@@ -7029,110 +7030,7 @@
             <a:lstStyle/>
             <a:p>
               <a:pPr algn="ctr"/>
-              <a:endParaRPr lang="en-US"/>
-            </a:p>
-          </p:txBody>
-        </p:sp>
-      </p:grpSp>
-      <p:grpSp>
-        <p:nvGrpSpPr>
-          <p:cNvPr id="108" name="Group 107">
-            <a:extLst>
-              <a:ext uri="{FF2B5EF4-FFF2-40B4-BE49-F238E27FC236}">
-                <a16:creationId xmlns:a16="http://schemas.microsoft.com/office/drawing/2014/main" id="{967444EB-DFC5-4339-B40C-DCF6FC337542}"/>
-              </a:ext>
-            </a:extLst>
-          </p:cNvPr>
-          <p:cNvGrpSpPr/>
-          <p:nvPr/>
-        </p:nvGrpSpPr>
-        <p:grpSpPr>
-          <a:xfrm rot="1529008">
-            <a:off x="2536706" y="1260924"/>
-            <a:ext cx="1448729" cy="246221"/>
-            <a:chOff x="5237909" y="5425866"/>
-            <a:chExt cx="1448729" cy="246221"/>
-          </a:xfrm>
-        </p:grpSpPr>
-        <p:sp>
-          <p:nvSpPr>
-            <p:cNvPr id="109" name="TextBox 108">
-              <a:extLst>
-                <a:ext uri="{FF2B5EF4-FFF2-40B4-BE49-F238E27FC236}">
-                  <a16:creationId xmlns:a16="http://schemas.microsoft.com/office/drawing/2014/main" id="{D9DB7DBD-92E8-A4B9-519B-AB2290A65564}"/>
-                </a:ext>
-              </a:extLst>
-            </p:cNvPr>
-            <p:cNvSpPr txBox="1"/>
-            <p:nvPr/>
-          </p:nvSpPr>
-          <p:spPr>
-            <a:xfrm rot="98778">
-              <a:off x="5237909" y="5425866"/>
-              <a:ext cx="1448729" cy="246221"/>
-            </a:xfrm>
-            <a:prstGeom prst="rect">
-              <a:avLst/>
-            </a:prstGeom>
-            <a:noFill/>
-          </p:spPr>
-          <p:txBody>
-            <a:bodyPr wrap="square" rtlCol="0">
-              <a:spAutoFit/>
-            </a:bodyPr>
-            <a:lstStyle/>
-            <a:p>
-              <a:r>
-                <a:rPr lang="en-US" sz="1000" dirty="0" err="1"/>
-                <a:t>requesst</a:t>
-              </a:r>
-              <a:endParaRPr lang="en-US" sz="1000" dirty="0"/>
-            </a:p>
-          </p:txBody>
-        </p:sp>
-        <p:sp>
-          <p:nvSpPr>
-            <p:cNvPr id="110" name="Isosceles Triangle 109">
-              <a:extLst>
-                <a:ext uri="{FF2B5EF4-FFF2-40B4-BE49-F238E27FC236}">
-                  <a16:creationId xmlns:a16="http://schemas.microsoft.com/office/drawing/2014/main" id="{A6BFB4AC-AC26-74BF-E209-EB46CD72CC34}"/>
-                </a:ext>
-              </a:extLst>
-            </p:cNvPr>
-            <p:cNvSpPr/>
-            <p:nvPr/>
-          </p:nvSpPr>
-          <p:spPr>
-            <a:xfrm rot="4722955">
-              <a:off x="6138600" y="5453643"/>
-              <a:ext cx="105257" cy="133535"/>
-            </a:xfrm>
-            <a:prstGeom prst="triangle">
-              <a:avLst/>
-            </a:prstGeom>
-          </p:spPr>
-          <p:style>
-            <a:lnRef idx="2">
-              <a:schemeClr val="accent1">
-                <a:shade val="15000"/>
-              </a:schemeClr>
-            </a:lnRef>
-            <a:fillRef idx="1">
-              <a:schemeClr val="accent1"/>
-            </a:fillRef>
-            <a:effectRef idx="0">
-              <a:schemeClr val="accent1"/>
-            </a:effectRef>
-            <a:fontRef idx="minor">
-              <a:schemeClr val="lt1"/>
-            </a:fontRef>
-          </p:style>
-          <p:txBody>
-            <a:bodyPr rtlCol="0" anchor="ctr"/>
-            <a:lstStyle/>
-            <a:p>
-              <a:pPr algn="ctr"/>
-              <a:endParaRPr lang="en-US"/>
+              <a:endParaRPr lang="en-US" dirty="0"/>
             </a:p>
           </p:txBody>
         </p:sp>
@@ -7151,7 +7049,7 @@
         </p:nvGrpSpPr>
         <p:grpSpPr>
           <a:xfrm>
-            <a:off x="127947" y="2199802"/>
+            <a:off x="266122" y="2102477"/>
             <a:ext cx="1717648" cy="457200"/>
             <a:chOff x="9861699" y="3997624"/>
             <a:chExt cx="2390978" cy="457200"/>
@@ -7237,6 +7135,319 @@
           </p:txBody>
         </p:sp>
       </p:grpSp>
+      <p:sp>
+        <p:nvSpPr>
+          <p:cNvPr id="2" name="TextBox 1">
+            <a:extLst>
+              <a:ext uri="{FF2B5EF4-FFF2-40B4-BE49-F238E27FC236}">
+                <a16:creationId xmlns:a16="http://schemas.microsoft.com/office/drawing/2014/main" id="{70E7507B-9E14-F4AD-4351-AD6B9B250210}"/>
+              </a:ext>
+            </a:extLst>
+          </p:cNvPr>
+          <p:cNvSpPr txBox="1"/>
+          <p:nvPr/>
+        </p:nvSpPr>
+        <p:spPr>
+          <a:xfrm>
+            <a:off x="4481978" y="517660"/>
+            <a:ext cx="1448729" cy="369332"/>
+          </a:xfrm>
+          <a:prstGeom prst="rect">
+            <a:avLst/>
+          </a:prstGeom>
+          <a:noFill/>
+        </p:spPr>
+        <p:txBody>
+          <a:bodyPr wrap="square" rtlCol="0">
+            <a:spAutoFit/>
+          </a:bodyPr>
+          <a:lstStyle/>
+          <a:p>
+            <a:r>
+              <a:rPr lang="en-US" dirty="0"/>
+              <a:t>1</a:t>
+            </a:r>
+          </a:p>
+        </p:txBody>
+      </p:sp>
+      <p:sp>
+        <p:nvSpPr>
+          <p:cNvPr id="3" name="TextBox 2">
+            <a:extLst>
+              <a:ext uri="{FF2B5EF4-FFF2-40B4-BE49-F238E27FC236}">
+                <a16:creationId xmlns:a16="http://schemas.microsoft.com/office/drawing/2014/main" id="{15C00C50-906E-01A2-64AC-438CB4BDE76F}"/>
+              </a:ext>
+            </a:extLst>
+          </p:cNvPr>
+          <p:cNvSpPr txBox="1"/>
+          <p:nvPr/>
+        </p:nvSpPr>
+        <p:spPr>
+          <a:xfrm>
+            <a:off x="2339067" y="2830511"/>
+            <a:ext cx="1448729" cy="369332"/>
+          </a:xfrm>
+          <a:prstGeom prst="rect">
+            <a:avLst/>
+          </a:prstGeom>
+          <a:noFill/>
+        </p:spPr>
+        <p:txBody>
+          <a:bodyPr wrap="square" rtlCol="0">
+            <a:spAutoFit/>
+          </a:bodyPr>
+          <a:lstStyle/>
+          <a:p>
+            <a:r>
+              <a:rPr lang="en-US" dirty="0"/>
+              <a:t>*</a:t>
+            </a:r>
+          </a:p>
+        </p:txBody>
+      </p:sp>
+      <p:sp>
+        <p:nvSpPr>
+          <p:cNvPr id="118" name="TextBox 117">
+            <a:extLst>
+              <a:ext uri="{FF2B5EF4-FFF2-40B4-BE49-F238E27FC236}">
+                <a16:creationId xmlns:a16="http://schemas.microsoft.com/office/drawing/2014/main" id="{5445625E-FE0F-620D-E676-A5792BCA85C1}"/>
+              </a:ext>
+            </a:extLst>
+          </p:cNvPr>
+          <p:cNvSpPr txBox="1"/>
+          <p:nvPr/>
+        </p:nvSpPr>
+        <p:spPr>
+          <a:xfrm>
+            <a:off x="1266713" y="1763153"/>
+            <a:ext cx="1448729" cy="369332"/>
+          </a:xfrm>
+          <a:prstGeom prst="rect">
+            <a:avLst/>
+          </a:prstGeom>
+          <a:noFill/>
+        </p:spPr>
+        <p:txBody>
+          <a:bodyPr wrap="square" rtlCol="0">
+            <a:spAutoFit/>
+          </a:bodyPr>
+          <a:lstStyle/>
+          <a:p>
+            <a:r>
+              <a:rPr lang="en-US" dirty="0"/>
+              <a:t>1</a:t>
+            </a:r>
+          </a:p>
+        </p:txBody>
+      </p:sp>
+      <p:sp>
+        <p:nvSpPr>
+          <p:cNvPr id="119" name="TextBox 118">
+            <a:extLst>
+              <a:ext uri="{FF2B5EF4-FFF2-40B4-BE49-F238E27FC236}">
+                <a16:creationId xmlns:a16="http://schemas.microsoft.com/office/drawing/2014/main" id="{3E319B24-6CC7-09C3-8568-BD4044699981}"/>
+              </a:ext>
+            </a:extLst>
+          </p:cNvPr>
+          <p:cNvSpPr txBox="1"/>
+          <p:nvPr/>
+        </p:nvSpPr>
+        <p:spPr>
+          <a:xfrm>
+            <a:off x="1258198" y="845902"/>
+            <a:ext cx="1448729" cy="369332"/>
+          </a:xfrm>
+          <a:prstGeom prst="rect">
+            <a:avLst/>
+          </a:prstGeom>
+          <a:noFill/>
+        </p:spPr>
+        <p:txBody>
+          <a:bodyPr wrap="square" rtlCol="0">
+            <a:spAutoFit/>
+          </a:bodyPr>
+          <a:lstStyle/>
+          <a:p>
+            <a:r>
+              <a:rPr lang="en-US" dirty="0"/>
+              <a:t>1</a:t>
+            </a:r>
+          </a:p>
+        </p:txBody>
+      </p:sp>
+      <p:grpSp>
+        <p:nvGrpSpPr>
+          <p:cNvPr id="120" name="Group 119">
+            <a:extLst>
+              <a:ext uri="{FF2B5EF4-FFF2-40B4-BE49-F238E27FC236}">
+                <a16:creationId xmlns:a16="http://schemas.microsoft.com/office/drawing/2014/main" id="{D08DBB43-928D-EC35-7415-9E1DAFC2C8ED}"/>
+              </a:ext>
+            </a:extLst>
+          </p:cNvPr>
+          <p:cNvGrpSpPr/>
+          <p:nvPr/>
+        </p:nvGrpSpPr>
+        <p:grpSpPr>
+          <a:xfrm rot="4090734">
+            <a:off x="2563195" y="-515013"/>
+            <a:ext cx="441162" cy="1531121"/>
+            <a:chOff x="4875561" y="5170822"/>
+            <a:chExt cx="441162" cy="1531121"/>
+          </a:xfrm>
+        </p:grpSpPr>
+        <p:sp>
+          <p:nvSpPr>
+            <p:cNvPr id="121" name="TextBox 120">
+              <a:extLst>
+                <a:ext uri="{FF2B5EF4-FFF2-40B4-BE49-F238E27FC236}">
+                  <a16:creationId xmlns:a16="http://schemas.microsoft.com/office/drawing/2014/main" id="{7639BBEF-53F2-4371-83F6-431C66138E90}"/>
+                </a:ext>
+              </a:extLst>
+            </p:cNvPr>
+            <p:cNvSpPr txBox="1"/>
+            <p:nvPr/>
+          </p:nvSpPr>
+          <p:spPr>
+            <a:xfrm rot="17509266">
+              <a:off x="4469248" y="5772076"/>
+              <a:ext cx="1448729" cy="246221"/>
+            </a:xfrm>
+            <a:prstGeom prst="rect">
+              <a:avLst/>
+            </a:prstGeom>
+            <a:noFill/>
+          </p:spPr>
+          <p:txBody>
+            <a:bodyPr wrap="square" rtlCol="0">
+              <a:spAutoFit/>
+            </a:bodyPr>
+            <a:lstStyle/>
+            <a:p>
+              <a:r>
+                <a:rPr lang="en-US" sz="1000" dirty="0" err="1"/>
+                <a:t>requesst</a:t>
+              </a:r>
+              <a:endParaRPr lang="en-US" sz="1000" dirty="0"/>
+            </a:p>
+          </p:txBody>
+        </p:sp>
+        <p:sp>
+          <p:nvSpPr>
+            <p:cNvPr id="122" name="Isosceles Triangle 121">
+              <a:extLst>
+                <a:ext uri="{FF2B5EF4-FFF2-40B4-BE49-F238E27FC236}">
+                  <a16:creationId xmlns:a16="http://schemas.microsoft.com/office/drawing/2014/main" id="{700FE96F-E260-FE52-11D0-6F04DE5007E3}"/>
+                </a:ext>
+              </a:extLst>
+            </p:cNvPr>
+            <p:cNvSpPr/>
+            <p:nvPr/>
+          </p:nvSpPr>
+          <p:spPr>
+            <a:xfrm rot="12276100">
+              <a:off x="4875561" y="6568408"/>
+              <a:ext cx="105257" cy="133535"/>
+            </a:xfrm>
+            <a:prstGeom prst="triangle">
+              <a:avLst/>
+            </a:prstGeom>
+          </p:spPr>
+          <p:style>
+            <a:lnRef idx="2">
+              <a:schemeClr val="accent1">
+                <a:shade val="15000"/>
+              </a:schemeClr>
+            </a:lnRef>
+            <a:fillRef idx="1">
+              <a:schemeClr val="accent1"/>
+            </a:fillRef>
+            <a:effectRef idx="0">
+              <a:schemeClr val="accent1"/>
+            </a:effectRef>
+            <a:fontRef idx="minor">
+              <a:schemeClr val="lt1"/>
+            </a:fontRef>
+          </p:style>
+          <p:txBody>
+            <a:bodyPr rtlCol="0" anchor="ctr"/>
+            <a:lstStyle/>
+            <a:p>
+              <a:pPr algn="ctr"/>
+              <a:endParaRPr lang="en-US" dirty="0"/>
+            </a:p>
+          </p:txBody>
+        </p:sp>
+      </p:grpSp>
+      <p:sp>
+        <p:nvSpPr>
+          <p:cNvPr id="123" name="TextBox 122">
+            <a:extLst>
+              <a:ext uri="{FF2B5EF4-FFF2-40B4-BE49-F238E27FC236}">
+                <a16:creationId xmlns:a16="http://schemas.microsoft.com/office/drawing/2014/main" id="{F0955178-8CA7-ECB5-FFFD-4EE80AA61C35}"/>
+              </a:ext>
+            </a:extLst>
+          </p:cNvPr>
+          <p:cNvSpPr txBox="1"/>
+          <p:nvPr/>
+        </p:nvSpPr>
+        <p:spPr>
+          <a:xfrm>
+            <a:off x="1888877" y="555375"/>
+            <a:ext cx="1448729" cy="369332"/>
+          </a:xfrm>
+          <a:prstGeom prst="rect">
+            <a:avLst/>
+          </a:prstGeom>
+          <a:noFill/>
+        </p:spPr>
+        <p:txBody>
+          <a:bodyPr wrap="square" rtlCol="0">
+            <a:spAutoFit/>
+          </a:bodyPr>
+          <a:lstStyle/>
+          <a:p>
+            <a:r>
+              <a:rPr lang="en-US" dirty="0"/>
+              <a:t>1</a:t>
+            </a:r>
+          </a:p>
+        </p:txBody>
+      </p:sp>
+      <p:sp>
+        <p:nvSpPr>
+          <p:cNvPr id="124" name="TextBox 123">
+            <a:extLst>
+              <a:ext uri="{FF2B5EF4-FFF2-40B4-BE49-F238E27FC236}">
+                <a16:creationId xmlns:a16="http://schemas.microsoft.com/office/drawing/2014/main" id="{26DE2FCA-5B03-3314-94D4-45A316E86EE6}"/>
+              </a:ext>
+            </a:extLst>
+          </p:cNvPr>
+          <p:cNvSpPr txBox="1"/>
+          <p:nvPr/>
+        </p:nvSpPr>
+        <p:spPr>
+          <a:xfrm>
+            <a:off x="2583747" y="530407"/>
+            <a:ext cx="1448729" cy="369332"/>
+          </a:xfrm>
+          <a:prstGeom prst="rect">
+            <a:avLst/>
+          </a:prstGeom>
+          <a:noFill/>
+        </p:spPr>
+        <p:txBody>
+          <a:bodyPr wrap="square" rtlCol="0">
+            <a:spAutoFit/>
+          </a:bodyPr>
+          <a:lstStyle/>
+          <a:p>
+            <a:r>
+              <a:rPr lang="en-US" dirty="0"/>
+              <a:t>1</a:t>
+            </a:r>
+          </a:p>
+        </p:txBody>
+      </p:sp>
     </p:spTree>
     <p:extLst>
       <p:ext uri="{BB962C8B-B14F-4D97-AF65-F5344CB8AC3E}">
@@ -7281,7 +7492,7 @@
         </p:nvGrpSpPr>
         <p:grpSpPr>
           <a:xfrm>
-            <a:off x="1283643" y="2694464"/>
+            <a:off x="1277191" y="2436067"/>
             <a:ext cx="1631499" cy="2433315"/>
             <a:chOff x="506864" y="371754"/>
             <a:chExt cx="1631499" cy="2656484"/>
@@ -8243,7 +8454,7 @@
         </p:nvGrpSpPr>
         <p:grpSpPr>
           <a:xfrm>
-            <a:off x="10446230" y="2836661"/>
+            <a:off x="10591373" y="3723466"/>
             <a:ext cx="1726070" cy="737711"/>
             <a:chOff x="363681" y="3385177"/>
             <a:chExt cx="1685906" cy="1393736"/>
@@ -8441,7 +8652,7 @@
         </p:nvGrpSpPr>
         <p:grpSpPr>
           <a:xfrm>
-            <a:off x="10465930" y="5000812"/>
+            <a:off x="10523987" y="5245126"/>
             <a:ext cx="1726070" cy="1229229"/>
             <a:chOff x="363681" y="3385177"/>
             <a:chExt cx="1685906" cy="2322347"/>
@@ -8658,7 +8869,7 @@
         </p:nvGrpSpPr>
         <p:grpSpPr>
           <a:xfrm>
-            <a:off x="10246468" y="222431"/>
+            <a:off x="10546986" y="1771202"/>
             <a:ext cx="1726070" cy="1303157"/>
             <a:chOff x="363681" y="3385177"/>
             <a:chExt cx="1685906" cy="2462017"/>
@@ -8882,7 +9093,7 @@
         </p:nvGrpSpPr>
         <p:grpSpPr>
           <a:xfrm>
-            <a:off x="7784233" y="211133"/>
+            <a:off x="10739976" y="252898"/>
             <a:ext cx="1726070" cy="1310764"/>
             <a:chOff x="363681" y="3385177"/>
             <a:chExt cx="1685906" cy="2476389"/>
@@ -9309,15 +9520,15 @@
           </p:cNvPr>
           <p:cNvCxnSpPr>
             <a:cxnSpLocks/>
-            <a:stCxn id="46" idx="2"/>
+            <a:stCxn id="46" idx="1"/>
             <a:endCxn id="14" idx="0"/>
           </p:cNvCxnSpPr>
           <p:nvPr/>
         </p:nvCxnSpPr>
         <p:spPr>
           <a:xfrm flipH="1">
-            <a:off x="8295915" y="1336367"/>
-            <a:ext cx="47794" cy="1574049"/>
+            <a:off x="8295915" y="827113"/>
+            <a:ext cx="2444061" cy="2083303"/>
           </a:xfrm>
           <a:prstGeom prst="line">
             <a:avLst/>
@@ -9353,13 +9564,14 @@
           <p:cNvCxnSpPr>
             <a:cxnSpLocks/>
             <a:stCxn id="28" idx="1"/>
+            <a:endCxn id="15" idx="3"/>
           </p:cNvCxnSpPr>
           <p:nvPr/>
         </p:nvCxnSpPr>
         <p:spPr>
-          <a:xfrm flipH="1">
-            <a:off x="8882063" y="3217115"/>
-            <a:ext cx="1564167" cy="359913"/>
+          <a:xfrm flipH="1" flipV="1">
+            <a:off x="9002518" y="3538621"/>
+            <a:ext cx="1588855" cy="565299"/>
           </a:xfrm>
           <a:prstGeom prst="line">
             <a:avLst/>
@@ -9400,8 +9612,8 @@
         </p:nvCxnSpPr>
         <p:spPr>
           <a:xfrm flipH="1" flipV="1">
-            <a:off x="8888516" y="3665550"/>
-            <a:ext cx="1577414" cy="1961475"/>
+            <a:off x="8963856" y="3665550"/>
+            <a:ext cx="1560131" cy="2205789"/>
           </a:xfrm>
           <a:prstGeom prst="line">
             <a:avLst/>
@@ -9443,8 +9655,8 @@
         </p:nvCxnSpPr>
         <p:spPr>
           <a:xfrm flipH="1">
-            <a:off x="8295915" y="883104"/>
-            <a:ext cx="1950553" cy="2027312"/>
+            <a:off x="8295915" y="2431875"/>
+            <a:ext cx="2251071" cy="478541"/>
           </a:xfrm>
           <a:prstGeom prst="line">
             <a:avLst/>
@@ -9730,7 +9942,7 @@
         </p:nvGrpSpPr>
         <p:grpSpPr>
           <a:xfrm>
-            <a:off x="4956126" y="263323"/>
+            <a:off x="7445317" y="91701"/>
             <a:ext cx="1560905" cy="1524131"/>
             <a:chOff x="361365" y="3429000"/>
             <a:chExt cx="1524584" cy="1698942"/>
@@ -10296,7 +10508,7 @@
         </p:nvGrpSpPr>
         <p:grpSpPr>
           <a:xfrm>
-            <a:off x="3115736" y="222431"/>
+            <a:off x="5088984" y="149903"/>
             <a:ext cx="1572322" cy="1469182"/>
             <a:chOff x="363681" y="3428999"/>
             <a:chExt cx="1535735" cy="1972455"/>
@@ -11096,7 +11308,7 @@
         </p:nvGrpSpPr>
         <p:grpSpPr>
           <a:xfrm>
-            <a:off x="1272975" y="468652"/>
+            <a:off x="2727410" y="201585"/>
             <a:ext cx="1572322" cy="1162613"/>
             <a:chOff x="363681" y="3429000"/>
             <a:chExt cx="1535735" cy="1462135"/>
@@ -11348,9 +11560,9 @@
           <p:nvPr/>
         </p:nvCxnSpPr>
         <p:spPr>
-          <a:xfrm>
-            <a:off x="5737764" y="1787454"/>
-            <a:ext cx="1762725" cy="1140699"/>
+          <a:xfrm flipH="1">
+            <a:off x="8219317" y="1615832"/>
+            <a:ext cx="7638" cy="1257543"/>
           </a:xfrm>
           <a:prstGeom prst="line">
             <a:avLst/>
@@ -11382,14 +11594,15 @@
           </p:cNvPr>
           <p:cNvCxnSpPr>
             <a:cxnSpLocks/>
+            <a:stCxn id="69" idx="2"/>
             <a:endCxn id="50" idx="0"/>
           </p:cNvCxnSpPr>
           <p:nvPr/>
         </p:nvCxnSpPr>
         <p:spPr>
           <a:xfrm flipH="1">
-            <a:off x="5478288" y="1787454"/>
-            <a:ext cx="239780" cy="1792838"/>
+            <a:off x="5478288" y="1615832"/>
+            <a:ext cx="2748667" cy="1964460"/>
           </a:xfrm>
           <a:prstGeom prst="line">
             <a:avLst/>
@@ -11506,8 +11719,8 @@
         </p:nvCxnSpPr>
         <p:spPr>
           <a:xfrm flipH="1">
-            <a:off x="2915142" y="1781621"/>
-            <a:ext cx="2717407" cy="2299718"/>
+            <a:off x="2908690" y="1245794"/>
+            <a:ext cx="4574407" cy="2577148"/>
           </a:xfrm>
           <a:prstGeom prst="line">
             <a:avLst/>
@@ -11546,8 +11759,8 @@
         </p:nvCxnSpPr>
         <p:spPr>
           <a:xfrm>
-            <a:off x="2915142" y="4081339"/>
-            <a:ext cx="1585077" cy="1398524"/>
+            <a:off x="2908690" y="3822942"/>
+            <a:ext cx="1591529" cy="1656920"/>
           </a:xfrm>
           <a:prstGeom prst="line">
             <a:avLst/>
@@ -11586,8 +11799,8 @@
         </p:nvCxnSpPr>
         <p:spPr>
           <a:xfrm flipH="1">
-            <a:off x="2062911" y="1631265"/>
-            <a:ext cx="3119" cy="1063199"/>
+            <a:off x="2056459" y="1364198"/>
+            <a:ext cx="1464006" cy="1071869"/>
           </a:xfrm>
           <a:prstGeom prst="line">
             <a:avLst/>
@@ -11620,13 +11833,14 @@
           <p:cNvCxnSpPr>
             <a:cxnSpLocks/>
             <a:stCxn id="80" idx="2"/>
+            <a:endCxn id="50" idx="0"/>
           </p:cNvCxnSpPr>
           <p:nvPr/>
         </p:nvCxnSpPr>
         <p:spPr>
-          <a:xfrm>
-            <a:off x="3908791" y="1691613"/>
-            <a:ext cx="1401961" cy="1840259"/>
+          <a:xfrm flipH="1">
+            <a:off x="5478288" y="1619085"/>
+            <a:ext cx="403751" cy="1961207"/>
           </a:xfrm>
           <a:prstGeom prst="line">
             <a:avLst/>
@@ -11664,8 +11878,8 @@
         </p:nvCxnSpPr>
         <p:spPr>
           <a:xfrm>
-            <a:off x="2651992" y="1686230"/>
-            <a:ext cx="2047029" cy="2017173"/>
+            <a:off x="3629012" y="1402686"/>
+            <a:ext cx="1070009" cy="2300717"/>
           </a:xfrm>
           <a:prstGeom prst="line">
             <a:avLst/>
@@ -11697,15 +11911,15 @@
           </p:cNvPr>
           <p:cNvCxnSpPr>
             <a:cxnSpLocks/>
-            <a:stCxn id="51" idx="1"/>
+            <a:stCxn id="52" idx="1"/>
             <a:endCxn id="92" idx="0"/>
           </p:cNvCxnSpPr>
           <p:nvPr/>
         </p:nvCxnSpPr>
         <p:spPr>
           <a:xfrm flipH="1">
-            <a:off x="2280902" y="4006497"/>
-            <a:ext cx="2512991" cy="1334523"/>
+            <a:off x="2280902" y="3911123"/>
+            <a:ext cx="2418119" cy="1429897"/>
           </a:xfrm>
           <a:prstGeom prst="line">
             <a:avLst/>
@@ -11882,8 +12096,8 @@
           <p:nvPr/>
         </p:nvSpPr>
         <p:spPr>
-          <a:xfrm rot="19463550">
-            <a:off x="6044227" y="1447867"/>
+          <a:xfrm>
+            <a:off x="8259056" y="1690409"/>
             <a:ext cx="1558533" cy="246221"/>
           </a:xfrm>
           <a:prstGeom prst="rect">
@@ -11918,7 +12132,7 @@
         </p:nvSpPr>
         <p:spPr>
           <a:xfrm rot="19463550">
-            <a:off x="7311581" y="2278091"/>
+            <a:off x="7822602" y="2241504"/>
             <a:ext cx="1558533" cy="246221"/>
           </a:xfrm>
           <a:prstGeom prst="rect">
@@ -11988,7 +12202,7 @@
         </p:nvSpPr>
         <p:spPr>
           <a:xfrm rot="19463550">
-            <a:off x="7994965" y="3789680"/>
+            <a:off x="8191042" y="3868305"/>
             <a:ext cx="1558533" cy="246221"/>
           </a:xfrm>
           <a:prstGeom prst="rect">
@@ -12198,7 +12412,7 @@
         </p:nvSpPr>
         <p:spPr>
           <a:xfrm rot="19463550">
-            <a:off x="4258566" y="3482383"/>
+            <a:off x="4199820" y="3453398"/>
             <a:ext cx="1558533" cy="246221"/>
           </a:xfrm>
           <a:prstGeom prst="rect">
@@ -12302,8 +12516,8 @@
           <p:nvPr/>
         </p:nvSpPr>
         <p:spPr>
-          <a:xfrm rot="19463550">
-            <a:off x="3950546" y="1333995"/>
+          <a:xfrm>
+            <a:off x="7093464" y="1451410"/>
             <a:ext cx="1558533" cy="246221"/>
           </a:xfrm>
           <a:prstGeom prst="rect">
@@ -12372,8 +12586,8 @@
           <p:nvPr/>
         </p:nvSpPr>
         <p:spPr>
-          <a:xfrm rot="19463550">
-            <a:off x="2771536" y="1379286"/>
+          <a:xfrm>
+            <a:off x="2810158" y="1468724"/>
             <a:ext cx="1558533" cy="246221"/>
           </a:xfrm>
           <a:prstGeom prst="rect">
@@ -12407,8 +12621,8 @@
           <p:nvPr/>
         </p:nvSpPr>
         <p:spPr>
-          <a:xfrm rot="19463550">
-            <a:off x="1570989" y="1284285"/>
+          <a:xfrm>
+            <a:off x="2439105" y="669189"/>
             <a:ext cx="1558533" cy="246221"/>
           </a:xfrm>
           <a:prstGeom prst="rect">
@@ -12442,8 +12656,8 @@
           <p:nvPr/>
         </p:nvSpPr>
         <p:spPr>
-          <a:xfrm rot="19463550">
-            <a:off x="1507335" y="2051964"/>
+          <a:xfrm>
+            <a:off x="2384547" y="2226730"/>
             <a:ext cx="1558533" cy="246221"/>
           </a:xfrm>
           <a:prstGeom prst="rect">
@@ -12477,8 +12691,8 @@
           <p:nvPr/>
         </p:nvSpPr>
         <p:spPr>
-          <a:xfrm rot="19463550">
-            <a:off x="5350475" y="2916473"/>
+          <a:xfrm rot="21594328">
+            <a:off x="5789996" y="3310525"/>
             <a:ext cx="1558533" cy="246221"/>
           </a:xfrm>
           <a:prstGeom prst="rect">
@@ -12512,8 +12726,8 @@
           <p:nvPr/>
         </p:nvSpPr>
         <p:spPr>
-          <a:xfrm rot="19463550">
-            <a:off x="5644043" y="1577052"/>
+          <a:xfrm>
+            <a:off x="7611074" y="1680559"/>
             <a:ext cx="1558533" cy="246221"/>
           </a:xfrm>
           <a:prstGeom prst="rect">
@@ -12547,8 +12761,8 @@
           <p:nvPr/>
         </p:nvSpPr>
         <p:spPr>
-          <a:xfrm rot="19463550">
-            <a:off x="4989519" y="1440552"/>
+          <a:xfrm>
+            <a:off x="5644643" y="1665647"/>
             <a:ext cx="1558533" cy="246221"/>
           </a:xfrm>
           <a:prstGeom prst="rect">
@@ -12583,7 +12797,7 @@
         </p:nvSpPr>
         <p:spPr>
           <a:xfrm rot="19463550">
-            <a:off x="2841118" y="3242003"/>
+            <a:off x="2855810" y="3110312"/>
             <a:ext cx="1558533" cy="246221"/>
           </a:xfrm>
           <a:prstGeom prst="rect">
@@ -12618,7 +12832,7 @@
         </p:nvSpPr>
         <p:spPr>
           <a:xfrm rot="19463550">
-            <a:off x="2941686" y="3731839"/>
+            <a:off x="2840571" y="3659618"/>
             <a:ext cx="1558533" cy="246221"/>
           </a:xfrm>
           <a:prstGeom prst="rect">
@@ -12734,7 +12948,7 @@
         </p:nvGrpSpPr>
         <p:grpSpPr>
           <a:xfrm>
-            <a:off x="42538" y="2203094"/>
+            <a:off x="427471" y="500376"/>
             <a:ext cx="1112603" cy="608215"/>
             <a:chOff x="339775" y="3429000"/>
             <a:chExt cx="1549709" cy="980837"/>
@@ -12930,7 +13144,7 @@
         </p:nvSpPr>
         <p:spPr>
           <a:xfrm>
-            <a:off x="136236" y="2557941"/>
+            <a:off x="523595" y="787117"/>
             <a:ext cx="953402" cy="253916"/>
           </a:xfrm>
           <a:prstGeom prst="rect">
@@ -12970,14 +13184,13 @@
           <p:cNvCxnSpPr>
             <a:cxnSpLocks/>
             <a:stCxn id="99" idx="1"/>
-            <a:endCxn id="142" idx="0"/>
           </p:cNvCxnSpPr>
           <p:nvPr/>
         </p:nvCxnSpPr>
         <p:spPr>
           <a:xfrm flipH="1">
-            <a:off x="588989" y="1181142"/>
-            <a:ext cx="697774" cy="1025027"/>
+            <a:off x="1581360" y="914075"/>
+            <a:ext cx="1159838" cy="34517"/>
           </a:xfrm>
           <a:prstGeom prst="line">
             <a:avLst/>
@@ -12998,6 +13211,186 @@
           </a:fontRef>
         </p:style>
       </p:cxnSp>
+      <p:sp>
+        <p:nvSpPr>
+          <p:cNvPr id="163" name="TextBox 162">
+            <a:extLst>
+              <a:ext uri="{FF2B5EF4-FFF2-40B4-BE49-F238E27FC236}">
+                <a16:creationId xmlns:a16="http://schemas.microsoft.com/office/drawing/2014/main" id="{2A9F61AC-DAFE-BB2D-640C-F2A1758080F1}"/>
+              </a:ext>
+            </a:extLst>
+          </p:cNvPr>
+          <p:cNvSpPr txBox="1"/>
+          <p:nvPr/>
+        </p:nvSpPr>
+        <p:spPr>
+          <a:xfrm>
+            <a:off x="1555475" y="683158"/>
+            <a:ext cx="1558533" cy="246221"/>
+          </a:xfrm>
+          <a:prstGeom prst="rect">
+            <a:avLst/>
+          </a:prstGeom>
+          <a:noFill/>
+        </p:spPr>
+        <p:txBody>
+          <a:bodyPr wrap="square" rtlCol="0">
+            <a:spAutoFit/>
+          </a:bodyPr>
+          <a:lstStyle/>
+          <a:p>
+            <a:r>
+              <a:rPr lang="en-US" sz="1000" dirty="0"/>
+              <a:t>1</a:t>
+            </a:r>
+          </a:p>
+        </p:txBody>
+      </p:sp>
+      <p:cxnSp>
+        <p:nvCxnSpPr>
+          <p:cNvPr id="164" name="Straight Connector 163">
+            <a:extLst>
+              <a:ext uri="{FF2B5EF4-FFF2-40B4-BE49-F238E27FC236}">
+                <a16:creationId xmlns:a16="http://schemas.microsoft.com/office/drawing/2014/main" id="{71D15102-7B33-A214-4BE5-7BF32BAC459A}"/>
+              </a:ext>
+            </a:extLst>
+          </p:cNvPr>
+          <p:cNvCxnSpPr>
+            <a:cxnSpLocks/>
+            <a:stCxn id="144" idx="2"/>
+            <a:endCxn id="8" idx="0"/>
+          </p:cNvCxnSpPr>
+          <p:nvPr/>
+        </p:nvCxnSpPr>
+        <p:spPr>
+          <a:xfrm>
+            <a:off x="992354" y="1108591"/>
+            <a:ext cx="1064105" cy="1327476"/>
+          </a:xfrm>
+          <a:prstGeom prst="line">
+            <a:avLst/>
+          </a:prstGeom>
+        </p:spPr>
+        <p:style>
+          <a:lnRef idx="2">
+            <a:schemeClr val="accent1"/>
+          </a:lnRef>
+          <a:fillRef idx="0">
+            <a:schemeClr val="accent1"/>
+          </a:fillRef>
+          <a:effectRef idx="1">
+            <a:schemeClr val="accent1"/>
+          </a:effectRef>
+          <a:fontRef idx="minor">
+            <a:schemeClr val="tx1"/>
+          </a:fontRef>
+        </p:style>
+      </p:cxnSp>
+      <p:sp>
+        <p:nvSpPr>
+          <p:cNvPr id="167" name="TextBox 166">
+            <a:extLst>
+              <a:ext uri="{FF2B5EF4-FFF2-40B4-BE49-F238E27FC236}">
+                <a16:creationId xmlns:a16="http://schemas.microsoft.com/office/drawing/2014/main" id="{1DA7DD43-37A2-10C3-7736-EEB741CD2D43}"/>
+              </a:ext>
+            </a:extLst>
+          </p:cNvPr>
+          <p:cNvSpPr txBox="1"/>
+          <p:nvPr/>
+        </p:nvSpPr>
+        <p:spPr>
+          <a:xfrm>
+            <a:off x="3752824" y="1451410"/>
+            <a:ext cx="1558533" cy="246221"/>
+          </a:xfrm>
+          <a:prstGeom prst="rect">
+            <a:avLst/>
+          </a:prstGeom>
+          <a:noFill/>
+        </p:spPr>
+        <p:txBody>
+          <a:bodyPr wrap="square" rtlCol="0">
+            <a:spAutoFit/>
+          </a:bodyPr>
+          <a:lstStyle/>
+          <a:p>
+            <a:r>
+              <a:rPr lang="en-US" sz="1000" dirty="0"/>
+              <a:t>1</a:t>
+            </a:r>
+          </a:p>
+        </p:txBody>
+      </p:sp>
+      <p:sp>
+        <p:nvSpPr>
+          <p:cNvPr id="168" name="TextBox 167">
+            <a:extLst>
+              <a:ext uri="{FF2B5EF4-FFF2-40B4-BE49-F238E27FC236}">
+                <a16:creationId xmlns:a16="http://schemas.microsoft.com/office/drawing/2014/main" id="{1E89EFBA-BD5A-E62A-BB49-613222593A25}"/>
+              </a:ext>
+            </a:extLst>
+          </p:cNvPr>
+          <p:cNvSpPr txBox="1"/>
+          <p:nvPr/>
+        </p:nvSpPr>
+        <p:spPr>
+          <a:xfrm>
+            <a:off x="1572299" y="2184597"/>
+            <a:ext cx="1558533" cy="246221"/>
+          </a:xfrm>
+          <a:prstGeom prst="rect">
+            <a:avLst/>
+          </a:prstGeom>
+          <a:noFill/>
+        </p:spPr>
+        <p:txBody>
+          <a:bodyPr wrap="square" rtlCol="0">
+            <a:spAutoFit/>
+          </a:bodyPr>
+          <a:lstStyle/>
+          <a:p>
+            <a:r>
+              <a:rPr lang="en-US" sz="1000" dirty="0"/>
+              <a:t>*</a:t>
+            </a:r>
+          </a:p>
+        </p:txBody>
+      </p:sp>
+      <p:sp>
+        <p:nvSpPr>
+          <p:cNvPr id="169" name="TextBox 168">
+            <a:extLst>
+              <a:ext uri="{FF2B5EF4-FFF2-40B4-BE49-F238E27FC236}">
+                <a16:creationId xmlns:a16="http://schemas.microsoft.com/office/drawing/2014/main" id="{7FC3165B-D115-FFD6-BC38-83EF9138539B}"/>
+              </a:ext>
+            </a:extLst>
+          </p:cNvPr>
+          <p:cNvSpPr txBox="1"/>
+          <p:nvPr/>
+        </p:nvSpPr>
+        <p:spPr>
+          <a:xfrm>
+            <a:off x="872036" y="1272032"/>
+            <a:ext cx="1558533" cy="246221"/>
+          </a:xfrm>
+          <a:prstGeom prst="rect">
+            <a:avLst/>
+          </a:prstGeom>
+          <a:noFill/>
+        </p:spPr>
+        <p:txBody>
+          <a:bodyPr wrap="square" rtlCol="0">
+            <a:spAutoFit/>
+          </a:bodyPr>
+          <a:lstStyle/>
+          <a:p>
+            <a:r>
+              <a:rPr lang="en-US" sz="1000" dirty="0"/>
+              <a:t>1</a:t>
+            </a:r>
+          </a:p>
+        </p:txBody>
+      </p:sp>
     </p:spTree>
     <p:extLst>
       <p:ext uri="{BB962C8B-B14F-4D97-AF65-F5344CB8AC3E}">

</xml_diff>